<commit_message>
add final, tweak sets-definitions.pptx sets-operations.pptx
</commit_message>
<xml_diff>
--- a/spring16/slidesS16/sets-definitions.pptx
+++ b/spring16/slidesS16/sets-definitions.pptx
@@ -2015,13 +2015,13 @@
   <p:clrMapOvr>
     <a:masterClrMapping/>
   </p:clrMapOvr>
-  <mc:AlternateContent xmlns:mc="http://schemas.openxmlformats.org/markup-compatibility/2006">
-    <mc:Choice xmlns:p14="http://schemas.microsoft.com/office/powerpoint/2010/main" Requires="p14">
+  <mc:AlternateContent xmlns:mc="http://schemas.openxmlformats.org/markup-compatibility/2006" xmlns:p14="http://schemas.microsoft.com/office/powerpoint/2010/main">
+    <mc:Choice Requires="p14">
       <p:transition spd="slow" p14:dur="900" advClick="0">
         <p:fade/>
       </p:transition>
     </mc:Choice>
-    <mc:Fallback>
+    <mc:Fallback xmlns="">
       <p:transition xmlns:p14="http://schemas.microsoft.com/office/powerpoint/2010/main" spd="slow" advClick="0">
         <p:fade/>
       </p:transition>
@@ -2162,13 +2162,13 @@
   <p:clrMapOvr>
     <a:masterClrMapping/>
   </p:clrMapOvr>
-  <mc:AlternateContent xmlns:mc="http://schemas.openxmlformats.org/markup-compatibility/2006">
-    <mc:Choice xmlns:p14="http://schemas.microsoft.com/office/powerpoint/2010/main" Requires="p14">
+  <mc:AlternateContent xmlns:mc="http://schemas.openxmlformats.org/markup-compatibility/2006" xmlns:p14="http://schemas.microsoft.com/office/powerpoint/2010/main">
+    <mc:Choice Requires="p14">
       <p:transition spd="slow" p14:dur="900" advClick="0">
         <p:fade/>
       </p:transition>
     </mc:Choice>
-    <mc:Fallback>
+    <mc:Fallback xmlns="">
       <p:transition xmlns:p14="http://schemas.microsoft.com/office/powerpoint/2010/main" spd="slow" advClick="0">
         <p:fade/>
       </p:transition>
@@ -2309,13 +2309,13 @@
   <p:clrMapOvr>
     <a:masterClrMapping/>
   </p:clrMapOvr>
-  <mc:AlternateContent xmlns:mc="http://schemas.openxmlformats.org/markup-compatibility/2006">
-    <mc:Choice xmlns:p14="http://schemas.microsoft.com/office/powerpoint/2010/main" Requires="p14">
+  <mc:AlternateContent xmlns:mc="http://schemas.openxmlformats.org/markup-compatibility/2006" xmlns:p14="http://schemas.microsoft.com/office/powerpoint/2010/main">
+    <mc:Choice Requires="p14">
       <p:transition spd="slow" p14:dur="900" advClick="0">
         <p:fade/>
       </p:transition>
     </mc:Choice>
-    <mc:Fallback>
+    <mc:Fallback xmlns="">
       <p:transition xmlns:p14="http://schemas.microsoft.com/office/powerpoint/2010/main" spd="slow" advClick="0">
         <p:fade/>
       </p:transition>
@@ -2450,13 +2450,13 @@
   <p:clrMapOvr>
     <a:masterClrMapping/>
   </p:clrMapOvr>
-  <mc:AlternateContent xmlns:mc="http://schemas.openxmlformats.org/markup-compatibility/2006">
-    <mc:Choice xmlns:p14="http://schemas.microsoft.com/office/powerpoint/2010/main" Requires="p14">
+  <mc:AlternateContent xmlns:mc="http://schemas.openxmlformats.org/markup-compatibility/2006" xmlns:p14="http://schemas.microsoft.com/office/powerpoint/2010/main">
+    <mc:Choice Requires="p14">
       <p:transition spd="slow" p14:dur="900" advClick="0">
         <p:fade/>
       </p:transition>
     </mc:Choice>
-    <mc:Fallback>
+    <mc:Fallback xmlns="">
       <p:transition xmlns:p14="http://schemas.microsoft.com/office/powerpoint/2010/main" spd="slow" advClick="0">
         <p:fade/>
       </p:transition>
@@ -2687,13 +2687,13 @@
   <p:clrMapOvr>
     <a:masterClrMapping/>
   </p:clrMapOvr>
-  <mc:AlternateContent xmlns:mc="http://schemas.openxmlformats.org/markup-compatibility/2006">
-    <mc:Choice xmlns:p14="http://schemas.microsoft.com/office/powerpoint/2010/main" Requires="p14">
+  <mc:AlternateContent xmlns:mc="http://schemas.openxmlformats.org/markup-compatibility/2006" xmlns:p14="http://schemas.microsoft.com/office/powerpoint/2010/main">
+    <mc:Choice Requires="p14">
       <p:transition spd="slow" p14:dur="900" advClick="0">
         <p:fade/>
       </p:transition>
     </mc:Choice>
-    <mc:Fallback>
+    <mc:Fallback xmlns="">
       <p:transition xmlns:p14="http://schemas.microsoft.com/office/powerpoint/2010/main" spd="slow" advClick="0">
         <p:fade/>
       </p:transition>
@@ -2754,13 +2754,13 @@
   <p:clrMapOvr>
     <a:masterClrMapping/>
   </p:clrMapOvr>
-  <mc:AlternateContent xmlns:mc="http://schemas.openxmlformats.org/markup-compatibility/2006">
-    <mc:Choice xmlns:p14="http://schemas.microsoft.com/office/powerpoint/2010/main" Requires="p14">
+  <mc:AlternateContent xmlns:mc="http://schemas.openxmlformats.org/markup-compatibility/2006" xmlns:p14="http://schemas.microsoft.com/office/powerpoint/2010/main">
+    <mc:Choice Requires="p14">
       <p:transition spd="slow" p14:dur="900" advClick="0">
         <p:fade/>
       </p:transition>
     </mc:Choice>
-    <mc:Fallback>
+    <mc:Fallback xmlns="">
       <p:transition xmlns:p14="http://schemas.microsoft.com/office/powerpoint/2010/main" spd="slow" advClick="0">
         <p:fade/>
       </p:transition>
@@ -2798,13 +2798,13 @@
   <p:clrMapOvr>
     <a:masterClrMapping/>
   </p:clrMapOvr>
-  <mc:AlternateContent xmlns:mc="http://schemas.openxmlformats.org/markup-compatibility/2006">
-    <mc:Choice xmlns:p14="http://schemas.microsoft.com/office/powerpoint/2010/main" Requires="p14">
+  <mc:AlternateContent xmlns:mc="http://schemas.openxmlformats.org/markup-compatibility/2006" xmlns:p14="http://schemas.microsoft.com/office/powerpoint/2010/main">
+    <mc:Choice Requires="p14">
       <p:transition spd="slow" p14:dur="900" advClick="0">
         <p:fade/>
       </p:transition>
     </mc:Choice>
-    <mc:Fallback>
+    <mc:Fallback xmlns="">
       <p:transition xmlns:p14="http://schemas.microsoft.com/office/powerpoint/2010/main" spd="slow" advClick="0">
         <p:fade/>
       </p:transition>
@@ -3047,30 +3047,6 @@
           </a:p>
         </p:txBody>
       </p:sp>
-      <p:pic>
-        <p:nvPicPr>
-          <p:cNvPr id="11" name="Picture 10" descr="license.img"/>
-          <p:cNvPicPr>
-            <a:picLocks/>
-          </p:cNvPicPr>
-          <p:nvPr userDrawn="1"/>
-        </p:nvPicPr>
-        <p:blipFill>
-          <a:blip r:embed="rId10" cstate="print"/>
-          <a:stretch>
-            <a:fillRect/>
-          </a:stretch>
-        </p:blipFill>
-        <p:spPr>
-          <a:xfrm>
-            <a:off x="38415" y="6553200"/>
-            <a:ext cx="875985" cy="290315"/>
-          </a:xfrm>
-          <a:prstGeom prst="rect">
-            <a:avLst/>
-          </a:prstGeom>
-        </p:spPr>
-      </p:pic>
       <p:sp>
         <p:nvSpPr>
           <p:cNvPr id="12" name="TextBox 11"/>
@@ -3148,6 +3124,30 @@
           </a:p>
         </p:txBody>
       </p:sp>
+      <p:pic>
+        <p:nvPicPr>
+          <p:cNvPr id="10" name="Picture 9"/>
+          <p:cNvPicPr>
+            <a:picLocks noChangeAspect="1"/>
+          </p:cNvPicPr>
+          <p:nvPr userDrawn="1"/>
+        </p:nvPicPr>
+        <p:blipFill>
+          <a:blip r:embed="rId10"/>
+          <a:stretch>
+            <a:fillRect/>
+          </a:stretch>
+        </p:blipFill>
+        <p:spPr>
+          <a:xfrm>
+            <a:off x="0" y="6500090"/>
+            <a:ext cx="1016000" cy="357909"/>
+          </a:xfrm>
+          <a:prstGeom prst="rect">
+            <a:avLst/>
+          </a:prstGeom>
+        </p:spPr>
+      </p:pic>
     </p:spTree>
   </p:cSld>
   <p:clrMap bg1="lt1" tx1="dk1" bg2="lt2" tx2="dk2" accent1="accent1" accent2="accent2" accent3="accent3" accent4="accent4" accent5="accent5" accent6="accent6" hlink="hlink" folHlink="folHlink"/>
@@ -3160,13 +3160,13 @@
     <p:sldLayoutId id="2147483656" r:id="rId6"/>
     <p:sldLayoutId id="2147483657" r:id="rId7"/>
   </p:sldLayoutIdLst>
-  <mc:AlternateContent xmlns:mc="http://schemas.openxmlformats.org/markup-compatibility/2006">
-    <mc:Choice xmlns:p14="http://schemas.microsoft.com/office/powerpoint/2010/main" Requires="p14">
+  <mc:AlternateContent xmlns:mc="http://schemas.openxmlformats.org/markup-compatibility/2006" xmlns:p14="http://schemas.microsoft.com/office/powerpoint/2010/main">
+    <mc:Choice Requires="p14">
       <p:transition spd="slow" p14:dur="900" advClick="0">
         <p:fade/>
       </p:transition>
     </mc:Choice>
-    <mc:Fallback>
+    <mc:Fallback xmlns="">
       <p:transition xmlns:p14="http://schemas.microsoft.com/office/powerpoint/2010/main" spd="slow" advClick="0">
         <p:fade/>
       </p:transition>
@@ -3767,7 +3767,7 @@
                 <a:ea typeface="+mj-ea"/>
                 <a:cs typeface="+mj-cs"/>
               </a:rPr>
-              <a:t>definitions</a:t>
+              <a:t>Definitions</a:t>
             </a:r>
             <a:endParaRPr kumimoji="0" lang="en-US" sz="8000" b="0" i="0" u="none" strike="noStrike" kern="0" cap="none" spc="0" normalizeH="0" baseline="0" noProof="0" dirty="0">
               <a:ln>
@@ -3791,11 +3791,11 @@
   <p:clrMapOvr>
     <a:masterClrMapping/>
   </p:clrMapOvr>
-  <mc:AlternateContent xmlns:mc="http://schemas.openxmlformats.org/markup-compatibility/2006">
-    <mc:Choice xmlns:p14="http://schemas.microsoft.com/office/powerpoint/2010/main" Requires="p14">
+  <mc:AlternateContent xmlns:mc="http://schemas.openxmlformats.org/markup-compatibility/2006" xmlns:p14="http://schemas.microsoft.com/office/powerpoint/2010/main">
+    <mc:Choice Requires="p14">
       <p:transition p14:dur="0" advClick="0"/>
     </mc:Choice>
-    <mc:Fallback>
+    <mc:Fallback xmlns="">
       <p:transition xmlns:p14="http://schemas.microsoft.com/office/powerpoint/2010/main" advClick="0"/>
     </mc:Fallback>
   </mc:AlternateContent>
@@ -4308,13 +4308,13 @@
   <p:clrMapOvr>
     <a:masterClrMapping/>
   </p:clrMapOvr>
-  <mc:AlternateContent xmlns:mc="http://schemas.openxmlformats.org/markup-compatibility/2006">
-    <mc:Choice xmlns:p14="http://schemas.microsoft.com/office/powerpoint/2010/main" Requires="p14">
+  <mc:AlternateContent xmlns:mc="http://schemas.openxmlformats.org/markup-compatibility/2006" xmlns:p14="http://schemas.microsoft.com/office/powerpoint/2010/main">
+    <mc:Choice Requires="p14">
       <p:transition spd="slow" p14:dur="900" advClick="0">
         <p:fade/>
       </p:transition>
     </mc:Choice>
-    <mc:Fallback>
+    <mc:Fallback xmlns="">
       <p:transition xmlns:p14="http://schemas.microsoft.com/office/powerpoint/2010/main" spd="slow" advClick="0">
         <p:fade/>
       </p:transition>
@@ -4765,7 +4765,7 @@
           <a:graphicData uri="http://schemas.openxmlformats.org/presentationml/2006/ole">
             <mc:AlternateContent xmlns:mc="http://schemas.openxmlformats.org/markup-compatibility/2006">
               <mc:Choice xmlns:v="urn:schemas-microsoft-com:vml" Requires="v">
-                <p:oleObj spid="_x0000_s530493" name="Equation" r:id="rId5" imgW="952500" imgH="241300" progId="Equation.DSMT4">
+                <p:oleObj spid="_x0000_s530495" name="Equation" r:id="rId5" imgW="952500" imgH="241300" progId="Equation.DSMT4">
                   <p:embed/>
                 </p:oleObj>
               </mc:Choice>
@@ -5077,7 +5077,7 @@
           <a:graphicData uri="http://schemas.openxmlformats.org/presentationml/2006/ole">
             <mc:AlternateContent xmlns:mc="http://schemas.openxmlformats.org/markup-compatibility/2006">
               <mc:Choice xmlns:v="urn:schemas-microsoft-com:vml" Requires="v">
-                <p:oleObj spid="_x0000_s1026" name="Equation" r:id="rId5" imgW="952500" imgH="241300" progId="Equation.DSMT4">
+                <p:oleObj spid="_x0000_s1028" name="Equation" r:id="rId5" imgW="952500" imgH="241300" progId="Equation.DSMT4">
                   <p:embed/>
                 </p:oleObj>
               </mc:Choice>
@@ -5276,7 +5276,7 @@
           <a:graphicData uri="http://schemas.openxmlformats.org/presentationml/2006/ole">
             <mc:AlternateContent xmlns:mc="http://schemas.openxmlformats.org/markup-compatibility/2006">
               <mc:Choice xmlns:v="urn:schemas-microsoft-com:vml" Requires="v">
-                <p:oleObj spid="_x0000_s528486" name="Equation" r:id="rId5" imgW="914400" imgH="220320" progId="Equation.DSMT4">
+                <p:oleObj spid="_x0000_s528489" name="Equation" r:id="rId5" imgW="914400" imgH="220320" progId="Equation.DSMT4">
                   <p:embed/>
                 </p:oleObj>
               </mc:Choice>
@@ -5352,7 +5352,7 @@
           <a:graphicData uri="http://schemas.openxmlformats.org/presentationml/2006/ole">
             <mc:AlternateContent xmlns:mc="http://schemas.openxmlformats.org/markup-compatibility/2006">
               <mc:Choice xmlns:v="urn:schemas-microsoft-com:vml" Requires="v">
-                <p:oleObj spid="_x0000_s528487" name="Equation" r:id="rId7" imgW="1193800" imgH="330200" progId="Equation.DSMT4">
+                <p:oleObj spid="_x0000_s528490" name="Equation" r:id="rId7" imgW="1193800" imgH="330200" progId="Equation.DSMT4">
                   <p:embed/>
                 </p:oleObj>
               </mc:Choice>
@@ -5408,13 +5408,13 @@
   <p:clrMapOvr>
     <a:masterClrMapping/>
   </p:clrMapOvr>
-  <mc:AlternateContent xmlns:mc="http://schemas.openxmlformats.org/markup-compatibility/2006">
-    <mc:Choice xmlns:p14="http://schemas.microsoft.com/office/powerpoint/2010/main" Requires="p14">
+  <mc:AlternateContent xmlns:mc="http://schemas.openxmlformats.org/markup-compatibility/2006" xmlns:p14="http://schemas.microsoft.com/office/powerpoint/2010/main">
+    <mc:Choice Requires="p14">
       <p:transition spd="slow" p14:dur="900" advClick="0">
         <p:fade/>
       </p:transition>
     </mc:Choice>
-    <mc:Fallback>
+    <mc:Fallback xmlns="">
       <p:transition xmlns:p14="http://schemas.microsoft.com/office/powerpoint/2010/main" spd="slow" advClick="0">
         <p:fade/>
       </p:transition>
@@ -7367,13 +7367,13 @@
   <p:clrMapOvr>
     <a:masterClrMapping/>
   </p:clrMapOvr>
-  <mc:AlternateContent xmlns:mc="http://schemas.openxmlformats.org/markup-compatibility/2006">
-    <mc:Choice xmlns:p14="http://schemas.microsoft.com/office/powerpoint/2010/main" Requires="p14">
+  <mc:AlternateContent xmlns:mc="http://schemas.openxmlformats.org/markup-compatibility/2006" xmlns:p14="http://schemas.microsoft.com/office/powerpoint/2010/main">
+    <mc:Choice Requires="p14">
       <p:transition spd="slow" p14:dur="900" advClick="0">
         <p:fade/>
       </p:transition>
     </mc:Choice>
-    <mc:Fallback>
+    <mc:Fallback xmlns="">
       <p:transition xmlns:p14="http://schemas.microsoft.com/office/powerpoint/2010/main" spd="slow" advClick="0">
         <p:fade/>
       </p:transition>
@@ -8581,13 +8581,13 @@
   <p:clrMapOvr>
     <a:masterClrMapping/>
   </p:clrMapOvr>
-  <mc:AlternateContent xmlns:mc="http://schemas.openxmlformats.org/markup-compatibility/2006">
-    <mc:Choice xmlns:p14="http://schemas.microsoft.com/office/powerpoint/2010/main" Requires="p14">
+  <mc:AlternateContent xmlns:mc="http://schemas.openxmlformats.org/markup-compatibility/2006" xmlns:p14="http://schemas.microsoft.com/office/powerpoint/2010/main">
+    <mc:Choice Requires="p14">
       <p:transition spd="slow" p14:dur="900" advClick="0">
         <p:fade/>
       </p:transition>
     </mc:Choice>
-    <mc:Fallback>
+    <mc:Fallback xmlns="">
       <p:transition xmlns:p14="http://schemas.microsoft.com/office/powerpoint/2010/main" spd="slow" advClick="0">
         <p:fade/>
       </p:transition>
@@ -9284,13 +9284,13 @@
   <p:clrMapOvr>
     <a:masterClrMapping/>
   </p:clrMapOvr>
-  <mc:AlternateContent xmlns:mc="http://schemas.openxmlformats.org/markup-compatibility/2006">
-    <mc:Choice xmlns:p14="http://schemas.microsoft.com/office/powerpoint/2010/main" Requires="p14">
+  <mc:AlternateContent xmlns:mc="http://schemas.openxmlformats.org/markup-compatibility/2006" xmlns:p14="http://schemas.microsoft.com/office/powerpoint/2010/main">
+    <mc:Choice Requires="p14">
       <p:transition spd="slow" p14:dur="1100" advClick="0">
         <p:fade thruBlk="1"/>
       </p:transition>
     </mc:Choice>
-    <mc:Fallback>
+    <mc:Fallback xmlns="">
       <p:transition xmlns:p14="http://schemas.microsoft.com/office/powerpoint/2010/main" spd="slow" advClick="0">
         <p:fade thruBlk="1"/>
       </p:transition>
@@ -10064,13 +10064,13 @@
   <p:clrMapOvr>
     <a:masterClrMapping/>
   </p:clrMapOvr>
-  <mc:AlternateContent xmlns:mc="http://schemas.openxmlformats.org/markup-compatibility/2006">
-    <mc:Choice xmlns:p14="http://schemas.microsoft.com/office/powerpoint/2010/main" Requires="p14">
+  <mc:AlternateContent xmlns:mc="http://schemas.openxmlformats.org/markup-compatibility/2006" xmlns:p14="http://schemas.microsoft.com/office/powerpoint/2010/main">
+    <mc:Choice Requires="p14">
       <p:transition spd="slow" p14:dur="900" advClick="0">
         <p:fade/>
       </p:transition>
     </mc:Choice>
-    <mc:Fallback>
+    <mc:Fallback xmlns="">
       <p:transition xmlns:p14="http://schemas.microsoft.com/office/powerpoint/2010/main" spd="slow" advClick="0">
         <p:fade/>
       </p:transition>
@@ -11325,17 +11325,7 @@
                 <a:latin typeface="Comic Sans MS" pitchFamily="66" charset="0"/>
                 <a:sym typeface="Euclid Symbol" pitchFamily="18" charset="2"/>
               </a:rPr>
-              <a:t> </a:t>
-            </a:r>
-            <a:r>
-              <a:rPr lang="en-US" sz="5400" dirty="0" smtClean="0">
-                <a:solidFill>
-                  <a:srgbClr val="0000FF"/>
-                </a:solidFill>
-                <a:latin typeface="Comic Sans MS" pitchFamily="66" charset="0"/>
-                <a:sym typeface="Euclid Symbol" pitchFamily="18" charset="2"/>
-              </a:rPr>
-              <a:t> A </a:t>
+              <a:t>  A </a:t>
             </a:r>
             <a:r>
               <a:rPr lang="en-US" sz="5400" dirty="0" smtClean="0">
@@ -11489,13 +11479,13 @@
   <p:clrMapOvr>
     <a:masterClrMapping/>
   </p:clrMapOvr>
-  <mc:AlternateContent xmlns:mc="http://schemas.openxmlformats.org/markup-compatibility/2006">
-    <mc:Choice xmlns:p14="http://schemas.microsoft.com/office/powerpoint/2010/main" Requires="p14">
+  <mc:AlternateContent xmlns:mc="http://schemas.openxmlformats.org/markup-compatibility/2006" xmlns:p14="http://schemas.microsoft.com/office/powerpoint/2010/main">
+    <mc:Choice Requires="p14">
       <p:transition spd="slow" p14:dur="900" advClick="0">
         <p:fade/>
       </p:transition>
     </mc:Choice>
-    <mc:Fallback>
+    <mc:Fallback xmlns="">
       <p:transition xmlns:p14="http://schemas.microsoft.com/office/powerpoint/2010/main" spd="slow" advClick="0">
         <p:fade/>
       </p:transition>

</xml_diff>